<commit_message>
Added Graph to the agenda
</commit_message>
<xml_diff>
--- a/lectures/Lecture 1 - Introduction.pptx
+++ b/lectures/Lecture 1 - Introduction.pptx
@@ -24040,7 +24040,7 @@
               <a:buNone/>
             </a:pPr>
             <a:r>
-              <a:rPr lang="en-US"/>
+              <a:rPr lang="en-US" dirty="0"/>
               <a:t>Agenda</a:t>
             </a:r>
           </a:p>
@@ -24058,7 +24058,7 @@
         </p:nvSpPr>
         <p:spPr>
           <a:xfrm>
-            <a:off x="457200" y="1200150"/>
+            <a:off x="362932" y="879638"/>
             <a:ext cx="8229600" cy="3394500"/>
           </a:xfrm>
           <a:prstGeom prst="rect">
@@ -24319,7 +24319,97 @@
                   <a:srgbClr val="000000"/>
                 </a:solidFill>
               </a:rPr>
-              <a:t>Lab 6 - Analytics</a:t>
+              <a:t>Lab 6 </a:t>
+            </a:r>
+            <a:r>
+              <a:rPr lang="en-US" dirty="0" smtClean="0">
+                <a:solidFill>
+                  <a:srgbClr val="000000"/>
+                </a:solidFill>
+              </a:rPr>
+              <a:t>– Analytics</a:t>
+            </a:r>
+          </a:p>
+          <a:p>
+            <a:pPr marL="457200" indent="-228600">
+              <a:spcBef>
+                <a:spcPts val="0"/>
+              </a:spcBef>
+              <a:buClr>
+                <a:srgbClr val="000000"/>
+              </a:buClr>
+            </a:pPr>
+            <a:r>
+              <a:rPr lang="en-US" dirty="0" smtClean="0">
+                <a:solidFill>
+                  <a:srgbClr val="000000"/>
+                </a:solidFill>
+              </a:rPr>
+              <a:t>Graph</a:t>
+            </a:r>
+            <a:endParaRPr lang="en-US" dirty="0">
+              <a:solidFill>
+                <a:srgbClr val="000000"/>
+              </a:solidFill>
+            </a:endParaRPr>
+          </a:p>
+          <a:p>
+            <a:pPr marL="857250" lvl="1" indent="-228600">
+              <a:spcBef>
+                <a:spcPts val="0"/>
+              </a:spcBef>
+              <a:buClr>
+                <a:srgbClr val="000000"/>
+              </a:buClr>
+            </a:pPr>
+            <a:r>
+              <a:rPr lang="en-US" dirty="0" smtClean="0">
+                <a:solidFill>
+                  <a:srgbClr val="000000"/>
+                </a:solidFill>
+              </a:rPr>
+              <a:t>Lecture - Graph</a:t>
+            </a:r>
+            <a:endParaRPr lang="en-US" dirty="0" smtClean="0">
+              <a:solidFill>
+                <a:srgbClr val="000000"/>
+              </a:solidFill>
+            </a:endParaRPr>
+          </a:p>
+          <a:p>
+            <a:pPr marL="857250" lvl="1" indent="-228600">
+              <a:spcBef>
+                <a:spcPts val="0"/>
+              </a:spcBef>
+              <a:buClr>
+                <a:srgbClr val="000000"/>
+              </a:buClr>
+            </a:pPr>
+            <a:r>
+              <a:rPr lang="en-US" dirty="0" smtClean="0">
+                <a:solidFill>
+                  <a:srgbClr val="000000"/>
+                </a:solidFill>
+              </a:rPr>
+              <a:t>Lab 7 – Graph</a:t>
+            </a:r>
+          </a:p>
+          <a:p>
+            <a:pPr marL="457200" indent="-228600">
+              <a:spcBef>
+                <a:spcPts val="0"/>
+              </a:spcBef>
+              <a:buClr>
+                <a:srgbClr val="000000"/>
+              </a:buClr>
+            </a:pPr>
+            <a:r>
+              <a:rPr lang="en-US" dirty="0" smtClean="0">
+                <a:solidFill>
+                  <a:srgbClr val="000000"/>
+                </a:solidFill>
+              </a:rPr>
+              <a:t>Operations</a:t>
             </a:r>
           </a:p>
           <a:p>
@@ -24332,12 +24422,51 @@
               </a:buClr>
             </a:pPr>
             <a:r>
+              <a:rPr lang="en-US" dirty="0" smtClean="0">
+                <a:solidFill>
+                  <a:srgbClr val="000000"/>
+                </a:solidFill>
+              </a:rPr>
+              <a:t>Lecture - Operations</a:t>
+            </a:r>
+            <a:endParaRPr lang="en-US" dirty="0">
+              <a:solidFill>
+                <a:srgbClr val="000000"/>
+              </a:solidFill>
+            </a:endParaRPr>
+          </a:p>
+          <a:p>
+            <a:pPr marL="857250" lvl="1" indent="-228600">
+              <a:spcBef>
+                <a:spcPts val="0"/>
+              </a:spcBef>
+              <a:buClr>
+                <a:srgbClr val="000000"/>
+              </a:buClr>
+            </a:pPr>
+            <a:r>
               <a:rPr lang="en-US" dirty="0">
                 <a:solidFill>
                   <a:srgbClr val="000000"/>
                 </a:solidFill>
               </a:rPr>
-              <a:t>Lab 7 - Operations</a:t>
+              <a:t>Lab </a:t>
+            </a:r>
+            <a:r>
+              <a:rPr lang="en-US" dirty="0" smtClean="0">
+                <a:solidFill>
+                  <a:srgbClr val="000000"/>
+                </a:solidFill>
+              </a:rPr>
+              <a:t>8 </a:t>
+            </a:r>
+            <a:r>
+              <a:rPr lang="en-US" dirty="0">
+                <a:solidFill>
+                  <a:srgbClr val="000000"/>
+                </a:solidFill>
+              </a:rPr>
+              <a:t>- Operations</a:t>
             </a:r>
           </a:p>
           <a:p>

</xml_diff>